<commit_message>
Added Lissie's mockup to slides, corrected team member names
</commit_message>
<xml_diff>
--- a/Community_ACTIONMaps.pptx
+++ b/Community_ACTIONMaps.pptx
@@ -9,6 +9,7 @@
     <p:sldId id="258" r:id="rId3"/>
     <p:sldId id="259" r:id="rId4"/>
     <p:sldId id="260" r:id="rId5"/>
+    <p:sldId id="261" r:id="rId6"/>
   </p:sldIdLst>
   <p:sldSz cx="9144000" cy="6858000" type="screen4x3"/>
   <p:notesSz cx="6858000" cy="9144000"/>
@@ -3202,11 +3203,19 @@
             </a:r>
             <a:r>
               <a:rPr lang="en-US" sz="2300" dirty="0" smtClean="0"/>
-              <a:t>, Lydia </a:t>
+              <a:t>, </a:t>
+            </a:r>
+            <a:r>
+              <a:rPr lang="en-US" sz="2300" dirty="0" smtClean="0"/>
+              <a:t>Lydia, </a:t>
             </a:r>
             <a:r>
               <a:rPr lang="en-US" sz="2300" dirty="0" err="1" smtClean="0"/>
-              <a:t>Lissein</a:t>
+              <a:t>Lissie</a:t>
+            </a:r>
+            <a:r>
+              <a:rPr lang="en-US" sz="2300" dirty="0" smtClean="0"/>
+              <a:t> Fein</a:t>
             </a:r>
             <a:r>
               <a:rPr lang="en-US" sz="2300" dirty="0" smtClean="0"/>
@@ -4171,17 +4180,7 @@
                   </a:schemeClr>
                 </a:solidFill>
               </a:rPr>
-              <a:t>Census </a:t>
-            </a:r>
-            <a:r>
-              <a:rPr lang="en-US" sz="2000" dirty="0" smtClean="0">
-                <a:solidFill>
-                  <a:schemeClr val="accent4">
-                    <a:lumMod val="75000"/>
-                  </a:schemeClr>
-                </a:solidFill>
-              </a:rPr>
-              <a:t>data</a:t>
+              <a:t>Census data</a:t>
             </a:r>
             <a:endParaRPr lang="en-US" sz="2000" dirty="0">
               <a:solidFill>
@@ -4248,6 +4247,103 @@
       </p:par>
     </p:tnLst>
   </p:timing>
+</p:sld>
+</file>
+
+<file path=ppt/slides/slide5.xml><?xml version="1.0" encoding="utf-8"?>
+<p:sld xmlns:a="http://schemas.openxmlformats.org/drawingml/2006/main" xmlns:r="http://schemas.openxmlformats.org/officeDocument/2006/relationships" xmlns:p="http://schemas.openxmlformats.org/presentationml/2006/main">
+  <p:cSld>
+    <p:spTree>
+      <p:nvGrpSpPr>
+        <p:cNvPr id="1" name=""/>
+        <p:cNvGrpSpPr/>
+        <p:nvPr/>
+      </p:nvGrpSpPr>
+      <p:grpSpPr>
+        <a:xfrm>
+          <a:off x="0" y="0"/>
+          <a:ext cx="0" cy="0"/>
+          <a:chOff x="0" y="0"/>
+          <a:chExt cx="0" cy="0"/>
+        </a:xfrm>
+      </p:grpSpPr>
+      <p:pic>
+        <p:nvPicPr>
+          <p:cNvPr id="4" name="Content Placeholder 3"/>
+          <p:cNvPicPr>
+            <a:picLocks noGrp="1" noChangeAspect="1"/>
+          </p:cNvPicPr>
+          <p:nvPr>
+            <p:ph idx="1"/>
+          </p:nvPr>
+        </p:nvPicPr>
+        <p:blipFill>
+          <a:blip r:embed="rId2">
+            <a:extLst>
+              <a:ext uri="{28A0092B-C50C-407E-A947-70E740481C1C}">
+                <a14:useLocalDpi xmlns:a14="http://schemas.microsoft.com/office/drawing/2010/main" val="0"/>
+              </a:ext>
+            </a:extLst>
+          </a:blip>
+          <a:stretch>
+            <a:fillRect/>
+          </a:stretch>
+        </p:blipFill>
+        <p:spPr>
+          <a:xfrm>
+            <a:off x="1600200" y="220967"/>
+            <a:ext cx="7391400" cy="6387019"/>
+          </a:xfrm>
+        </p:spPr>
+      </p:pic>
+      <p:sp>
+        <p:nvSpPr>
+          <p:cNvPr id="6" name="TextBox 5"/>
+          <p:cNvSpPr txBox="1"/>
+          <p:nvPr/>
+        </p:nvSpPr>
+        <p:spPr>
+          <a:xfrm>
+            <a:off x="533400" y="2065787"/>
+            <a:ext cx="800219" cy="2658613"/>
+          </a:xfrm>
+          <a:prstGeom prst="rect">
+            <a:avLst/>
+          </a:prstGeom>
+          <a:noFill/>
+        </p:spPr>
+        <p:txBody>
+          <a:bodyPr vert="vert270" wrap="none" rtlCol="0">
+            <a:spAutoFit/>
+          </a:bodyPr>
+          <a:lstStyle/>
+          <a:p>
+            <a:r>
+              <a:rPr lang="en-US" sz="4000" dirty="0" smtClean="0">
+                <a:solidFill>
+                  <a:srgbClr val="4E6D9C"/>
+                </a:solidFill>
+              </a:rPr>
+              <a:t>Our mockup</a:t>
+            </a:r>
+            <a:endParaRPr lang="en-US" sz="4000" dirty="0">
+              <a:solidFill>
+                <a:srgbClr val="4E6D9C"/>
+              </a:solidFill>
+            </a:endParaRPr>
+          </a:p>
+        </p:txBody>
+      </p:sp>
+    </p:spTree>
+    <p:extLst>
+      <p:ext uri="{BB962C8B-B14F-4D97-AF65-F5344CB8AC3E}">
+        <p14:creationId xmlns:p14="http://schemas.microsoft.com/office/powerpoint/2010/main" val="882344727"/>
+      </p:ext>
+    </p:extLst>
+  </p:cSld>
+  <p:clrMapOvr>
+    <a:masterClrMapping/>
+  </p:clrMapOvr>
 </p:sld>
 </file>
 

</xml_diff>

<commit_message>
Reshaped text box for team member names
</commit_message>
<xml_diff>
--- a/Community_ACTIONMaps.pptx
+++ b/Community_ACTIONMaps.pptx
@@ -3173,7 +3173,12 @@
             <p:ph type="subTitle" idx="1"/>
           </p:nvPr>
         </p:nvSpPr>
-        <p:spPr/>
+        <p:spPr>
+          <a:xfrm>
+            <a:off x="1295400" y="3886200"/>
+            <a:ext cx="6629400" cy="1752600"/>
+          </a:xfrm>
+        </p:spPr>
         <p:txBody>
           <a:bodyPr>
             <a:noAutofit/>
@@ -3203,11 +3208,7 @@
             </a:r>
             <a:r>
               <a:rPr lang="en-US" sz="2300" dirty="0" smtClean="0"/>
-              <a:t>, </a:t>
-            </a:r>
-            <a:r>
-              <a:rPr lang="en-US" sz="2300" dirty="0" smtClean="0"/>
-              <a:t>Lydia, </a:t>
+              <a:t>, Lydia, </a:t>
             </a:r>
             <a:r>
               <a:rPr lang="en-US" sz="2300" dirty="0" err="1" smtClean="0"/>
@@ -3215,11 +3216,7 @@
             </a:r>
             <a:r>
               <a:rPr lang="en-US" sz="2300" dirty="0" smtClean="0"/>
-              <a:t> Fein</a:t>
-            </a:r>
-            <a:r>
-              <a:rPr lang="en-US" sz="2300" dirty="0" smtClean="0"/>
-              <a:t>, Kevin McKenna, Bob Stark, Matthew </a:t>
+              <a:t> Fein, Kevin McKenna, Bob Stark, Matthew </a:t>
             </a:r>
             <a:r>
               <a:rPr lang="en-US" sz="2300" dirty="0" err="1" smtClean="0"/>

</xml_diff>